<commit_message>
Update unknownOS - 2021年操作系统课程设计演示.pptx
</commit_message>
<xml_diff>
--- a/19组/unknownOS - 2021年操作系统课程设计演示.pptx
+++ b/19组/unknownOS - 2021年操作系统课程设计演示.pptx
@@ -23,10 +23,15 @@
     <p:sldId id="271" r:id="rId17"/>
     <p:sldId id="274" r:id="rId18"/>
     <p:sldId id="275" r:id="rId19"/>
-    <p:sldId id="276" r:id="rId20"/>
-    <p:sldId id="277" r:id="rId21"/>
-    <p:sldId id="278" r:id="rId22"/>
-    <p:sldId id="279" r:id="rId23"/>
+    <p:sldId id="280" r:id="rId20"/>
+    <p:sldId id="281" r:id="rId21"/>
+    <p:sldId id="283" r:id="rId22"/>
+    <p:sldId id="276" r:id="rId23"/>
+    <p:sldId id="277" r:id="rId24"/>
+    <p:sldId id="278" r:id="rId25"/>
+    <p:sldId id="279" r:id="rId26"/>
+    <p:sldId id="282" r:id="rId27"/>
+    <p:sldId id="284" r:id="rId28"/>
   </p:sldIdLst>
   <p:sldSz cx="12192000" cy="6858000"/>
   <p:notesSz cx="6858000" cy="9144000"/>
@@ -1461,7 +1466,7 @@
           <a:p>
             <a:fld id="{5E7AA473-D82F-4EFF-9DF7-AE6D83C51288}" type="datetime1">
               <a:rPr lang="en-US" smtClean="0"/>
-              <a:t>8/30/2021</a:t>
+              <a:t>8/31/2021</a:t>
             </a:fld>
             <a:endParaRPr lang="en-US"/>
           </a:p>
@@ -1715,7 +1720,7 @@
           <a:p>
             <a:fld id="{1E12F1F0-FE2D-4C1C-B320-8CB9BE735F0F}" type="datetime1">
               <a:rPr lang="en-US" smtClean="0"/>
-              <a:t>8/30/2021</a:t>
+              <a:t>8/31/2021</a:t>
             </a:fld>
             <a:endParaRPr lang="en-US"/>
           </a:p>
@@ -1983,7 +1988,7 @@
           <a:p>
             <a:fld id="{2CF1B96C-10FD-4EBC-9029-9652B7535D02}" type="datetime1">
               <a:rPr lang="en-US" smtClean="0"/>
-              <a:t>8/30/2021</a:t>
+              <a:t>8/31/2021</a:t>
             </a:fld>
             <a:endParaRPr lang="en-US"/>
           </a:p>
@@ -2237,7 +2242,7 @@
           <a:p>
             <a:fld id="{14878474-CC00-4A95-9D50-A41C12D1EEC4}" type="datetime1">
               <a:rPr lang="en-US" smtClean="0"/>
-              <a:t>8/30/2021</a:t>
+              <a:t>8/31/2021</a:t>
             </a:fld>
             <a:endParaRPr lang="en-US"/>
           </a:p>
@@ -2515,7 +2520,7 @@
           <a:p>
             <a:fld id="{7F38C8B4-7FBB-408F-BDB9-F0496874AFB2}" type="datetime1">
               <a:rPr lang="en-US" smtClean="0"/>
-              <a:t>8/30/2021</a:t>
+              <a:t>8/31/2021</a:t>
             </a:fld>
             <a:endParaRPr lang="en-US"/>
           </a:p>
@@ -2787,7 +2792,7 @@
           <a:p>
             <a:fld id="{2BB8EE20-A5E2-47D3-8F6D-A2BA7AB2E093}" type="datetime1">
               <a:rPr lang="en-US" smtClean="0"/>
-              <a:t>8/30/2021</a:t>
+              <a:t>8/31/2021</a:t>
             </a:fld>
             <a:endParaRPr lang="en-US"/>
           </a:p>
@@ -3345,7 +3350,7 @@
           <a:p>
             <a:fld id="{3382CF99-132F-413F-B7EF-71A5C33F2ED6}" type="datetime1">
               <a:rPr lang="en-US" smtClean="0"/>
-              <a:t>8/30/2021</a:t>
+              <a:t>8/31/2021</a:t>
             </a:fld>
             <a:endParaRPr lang="en-US"/>
           </a:p>
@@ -3487,7 +3492,7 @@
           <a:p>
             <a:fld id="{1F17AE06-98E0-4D9F-A059-92C3548821BB}" type="datetime1">
               <a:rPr lang="en-US" smtClean="0"/>
-              <a:t>8/30/2021</a:t>
+              <a:t>8/31/2021</a:t>
             </a:fld>
             <a:endParaRPr lang="en-US"/>
           </a:p>
@@ -3600,7 +3605,7 @@
           <a:p>
             <a:fld id="{FFBA00CA-3DDC-4705-B840-978EF5EA0707}" type="datetime1">
               <a:rPr lang="en-US" smtClean="0"/>
-              <a:t>8/30/2021</a:t>
+              <a:t>8/31/2021</a:t>
             </a:fld>
             <a:endParaRPr lang="en-US"/>
           </a:p>
@@ -3919,7 +3924,7 @@
           <a:p>
             <a:fld id="{FC366D49-0BBA-4C5A-AD96-6448CA63451A}" type="datetime1">
               <a:rPr lang="en-US" smtClean="0"/>
-              <a:t>8/30/2021</a:t>
+              <a:t>8/31/2021</a:t>
             </a:fld>
             <a:endParaRPr lang="en-US"/>
           </a:p>
@@ -4216,7 +4221,7 @@
           <a:p>
             <a:fld id="{4F4EB293-A316-472D-A8B4-6947CF1A12B7}" type="datetime1">
               <a:rPr lang="en-US" smtClean="0"/>
-              <a:t>8/30/2021</a:t>
+              <a:t>8/31/2021</a:t>
             </a:fld>
             <a:endParaRPr lang="en-US"/>
           </a:p>
@@ -4491,7 +4496,7 @@
           <a:p>
             <a:fld id="{734BCCD4-CEB1-405B-A443-DD9CBCBEA552}" type="datetime1">
               <a:rPr lang="en-US" smtClean="0"/>
-              <a:t>8/30/2021</a:t>
+              <a:t>8/31/2021</a:t>
             </a:fld>
             <a:endParaRPr lang="en-US"/>
           </a:p>
@@ -7632,7 +7637,7 @@
           <p:cNvPr id="2" name="标题 1">
             <a:extLst>
               <a:ext uri="{FF2B5EF4-FFF2-40B4-BE49-F238E27FC236}">
-                <a16:creationId xmlns:a16="http://schemas.microsoft.com/office/drawing/2014/main" id="{944B6395-522D-4E7B-8C66-A03B077A9030}"/>
+                <a16:creationId xmlns:a16="http://schemas.microsoft.com/office/drawing/2014/main" id="{B56BA890-55CD-450A-A5ED-F7FB812D219F}"/>
               </a:ext>
             </a:extLst>
           </p:cNvPr>
@@ -7649,26 +7654,274 @@
           <a:lstStyle/>
           <a:p>
             <a:r>
-              <a:rPr lang="en-US" altLang="zh-CN" sz="5400" dirty="0"/>
-              <a:t>Part 3 – </a:t>
-            </a:r>
-            <a:r>
-              <a:rPr lang="zh-CN" altLang="en-US" sz="5400" dirty="0"/>
-              <a:t>用户及应用的演示、实现和说明</a:t>
-            </a:r>
-          </a:p>
-        </p:txBody>
-      </p:sp>
+              <a:rPr lang="zh-CN" altLang="en-US" dirty="0"/>
+              <a:t>系统级应用：</a:t>
+            </a:r>
+            <a:br>
+              <a:rPr lang="en-US" altLang="zh-CN" dirty="0"/>
+            </a:br>
+            <a:r>
+              <a:rPr lang="zh-CN" altLang="en-US" dirty="0"/>
+              <a:t>进程管理</a:t>
+            </a:r>
+          </a:p>
+        </p:txBody>
+      </p:sp>
+      <p:sp>
+        <p:nvSpPr>
+          <p:cNvPr id="5" name="文本框 4">
+            <a:extLst>
+              <a:ext uri="{FF2B5EF4-FFF2-40B4-BE49-F238E27FC236}">
+                <a16:creationId xmlns:a16="http://schemas.microsoft.com/office/drawing/2014/main" id="{C35340E5-2FD9-4AD2-9362-B9C6867A6953}"/>
+              </a:ext>
+            </a:extLst>
+          </p:cNvPr>
+          <p:cNvSpPr txBox="1"/>
+          <p:nvPr/>
+        </p:nvSpPr>
+        <p:spPr>
+          <a:xfrm>
+            <a:off x="5395650" y="1169093"/>
+            <a:ext cx="5021182" cy="1477328"/>
+          </a:xfrm>
+          <a:prstGeom prst="rect">
+            <a:avLst/>
+          </a:prstGeom>
+          <a:noFill/>
+        </p:spPr>
+        <p:txBody>
+          <a:bodyPr wrap="square" rtlCol="0">
+            <a:spAutoFit/>
+          </a:bodyPr>
+          <a:lstStyle/>
+          <a:p>
+            <a:r>
+              <a:rPr lang="zh-CN" altLang="en-US" dirty="0"/>
+              <a:t>输入</a:t>
+            </a:r>
+            <a:r>
+              <a:rPr lang="en-US" altLang="zh-CN" dirty="0"/>
+              <a:t>process</a:t>
+            </a:r>
+            <a:r>
+              <a:rPr lang="zh-CN" altLang="en-US" dirty="0"/>
+              <a:t>进入进程管理，展示欢迎页，提示用户各项指令名和功能。</a:t>
+            </a:r>
+            <a:endParaRPr lang="en-US" altLang="zh-CN" dirty="0"/>
+          </a:p>
+          <a:p>
+            <a:endParaRPr lang="en-US" altLang="zh-CN" dirty="0"/>
+          </a:p>
+          <a:p>
+            <a:r>
+              <a:rPr lang="zh-CN" altLang="en-US" dirty="0"/>
+              <a:t>输入</a:t>
+            </a:r>
+            <a:r>
+              <a:rPr lang="en-US" altLang="zh-CN" dirty="0"/>
+              <a:t>show</a:t>
+            </a:r>
+            <a:r>
+              <a:rPr lang="zh-CN" altLang="en-US" dirty="0"/>
+              <a:t>，展示本系统当前所有进程的</a:t>
+            </a:r>
+            <a:r>
+              <a:rPr lang="en-US" altLang="zh-CN" dirty="0"/>
+              <a:t>id</a:t>
+            </a:r>
+            <a:r>
+              <a:rPr lang="zh-CN" altLang="en-US" dirty="0"/>
+              <a:t>，进程名，优先级和是否在运行。</a:t>
+            </a:r>
+          </a:p>
+        </p:txBody>
+      </p:sp>
+      <p:pic>
+        <p:nvPicPr>
+          <p:cNvPr id="6" name="图片 5">
+            <a:extLst>
+              <a:ext uri="{FF2B5EF4-FFF2-40B4-BE49-F238E27FC236}">
+                <a16:creationId xmlns:a16="http://schemas.microsoft.com/office/drawing/2014/main" id="{06925BC6-2DD8-4707-B03F-9FC53E36AA4F}"/>
+              </a:ext>
+            </a:extLst>
+          </p:cNvPr>
+          <p:cNvPicPr>
+            <a:picLocks noChangeAspect="1"/>
+          </p:cNvPicPr>
+          <p:nvPr/>
+        </p:nvPicPr>
+        <p:blipFill>
+          <a:blip r:embed="rId2">
+            <a:extLst>
+              <a:ext uri="{28A0092B-C50C-407E-A947-70E740481C1C}">
+                <a14:useLocalDpi xmlns:a14="http://schemas.microsoft.com/office/drawing/2010/main" val="0"/>
+              </a:ext>
+            </a:extLst>
+          </a:blip>
+          <a:stretch>
+            <a:fillRect/>
+          </a:stretch>
+        </p:blipFill>
+        <p:spPr>
+          <a:xfrm>
+            <a:off x="4957762" y="3019425"/>
+            <a:ext cx="6905625" cy="2495550"/>
+          </a:xfrm>
+          <a:prstGeom prst="rect">
+            <a:avLst/>
+          </a:prstGeom>
+        </p:spPr>
+      </p:pic>
     </p:spTree>
     <p:extLst>
       <p:ext uri="{BB962C8B-B14F-4D97-AF65-F5344CB8AC3E}">
-        <p14:creationId xmlns:p14="http://schemas.microsoft.com/office/powerpoint/2010/main" val="2129066617"/>
+        <p14:creationId xmlns:p14="http://schemas.microsoft.com/office/powerpoint/2010/main" val="829149626"/>
       </p:ext>
     </p:extLst>
   </p:cSld>
   <p:clrMapOvr>
     <a:masterClrMapping/>
   </p:clrMapOvr>
+  <p:timing>
+    <p:tnLst>
+      <p:par>
+        <p:cTn id="1" dur="indefinite" restart="never" nodeType="tmRoot">
+          <p:childTnLst>
+            <p:seq concurrent="1" nextAc="seek">
+              <p:cTn id="2" dur="indefinite" nodeType="mainSeq">
+                <p:childTnLst>
+                  <p:par>
+                    <p:cTn id="3" fill="hold">
+                      <p:stCondLst>
+                        <p:cond delay="indefinite"/>
+                      </p:stCondLst>
+                      <p:childTnLst>
+                        <p:par>
+                          <p:cTn id="4" fill="hold">
+                            <p:stCondLst>
+                              <p:cond delay="0"/>
+                            </p:stCondLst>
+                            <p:childTnLst>
+                              <p:par>
+                                <p:cTn id="5" presetID="10" presetClass="entr" presetSubtype="0" fill="hold" grpId="0" nodeType="clickEffect">
+                                  <p:stCondLst>
+                                    <p:cond delay="0"/>
+                                  </p:stCondLst>
+                                  <p:childTnLst>
+                                    <p:set>
+                                      <p:cBhvr>
+                                        <p:cTn id="6" dur="1" fill="hold">
+                                          <p:stCondLst>
+                                            <p:cond delay="0"/>
+                                          </p:stCondLst>
+                                        </p:cTn>
+                                        <p:tgtEl>
+                                          <p:spTgt spid="2"/>
+                                        </p:tgtEl>
+                                        <p:attrNameLst>
+                                          <p:attrName>style.visibility</p:attrName>
+                                        </p:attrNameLst>
+                                      </p:cBhvr>
+                                      <p:to>
+                                        <p:strVal val="visible"/>
+                                      </p:to>
+                                    </p:set>
+                                    <p:animEffect transition="in" filter="fade">
+                                      <p:cBhvr>
+                                        <p:cTn id="7" dur="500"/>
+                                        <p:tgtEl>
+                                          <p:spTgt spid="2"/>
+                                        </p:tgtEl>
+                                      </p:cBhvr>
+                                    </p:animEffect>
+                                  </p:childTnLst>
+                                </p:cTn>
+                              </p:par>
+                            </p:childTnLst>
+                          </p:cTn>
+                        </p:par>
+                      </p:childTnLst>
+                    </p:cTn>
+                  </p:par>
+                  <p:par>
+                    <p:cTn id="8" fill="hold">
+                      <p:stCondLst>
+                        <p:cond delay="indefinite"/>
+                      </p:stCondLst>
+                      <p:childTnLst>
+                        <p:par>
+                          <p:cTn id="9" fill="hold">
+                            <p:stCondLst>
+                              <p:cond delay="0"/>
+                            </p:stCondLst>
+                            <p:childTnLst>
+                              <p:par>
+                                <p:cTn id="10" presetID="10" presetClass="entr" presetSubtype="0" fill="hold" grpId="0" nodeType="clickEffect">
+                                  <p:stCondLst>
+                                    <p:cond delay="0"/>
+                                  </p:stCondLst>
+                                  <p:childTnLst>
+                                    <p:set>
+                                      <p:cBhvr>
+                                        <p:cTn id="11" dur="1" fill="hold">
+                                          <p:stCondLst>
+                                            <p:cond delay="0"/>
+                                          </p:stCondLst>
+                                        </p:cTn>
+                                        <p:tgtEl>
+                                          <p:spTgt spid="5"/>
+                                        </p:tgtEl>
+                                        <p:attrNameLst>
+                                          <p:attrName>style.visibility</p:attrName>
+                                        </p:attrNameLst>
+                                      </p:cBhvr>
+                                      <p:to>
+                                        <p:strVal val="visible"/>
+                                      </p:to>
+                                    </p:set>
+                                    <p:animEffect transition="in" filter="fade">
+                                      <p:cBhvr>
+                                        <p:cTn id="12" dur="500"/>
+                                        <p:tgtEl>
+                                          <p:spTgt spid="5"/>
+                                        </p:tgtEl>
+                                      </p:cBhvr>
+                                    </p:animEffect>
+                                  </p:childTnLst>
+                                </p:cTn>
+                              </p:par>
+                            </p:childTnLst>
+                          </p:cTn>
+                        </p:par>
+                      </p:childTnLst>
+                    </p:cTn>
+                  </p:par>
+                </p:childTnLst>
+              </p:cTn>
+              <p:prevCondLst>
+                <p:cond evt="onPrev" delay="0">
+                  <p:tgtEl>
+                    <p:sldTgt/>
+                  </p:tgtEl>
+                </p:cond>
+              </p:prevCondLst>
+              <p:nextCondLst>
+                <p:cond evt="onNext" delay="0">
+                  <p:tgtEl>
+                    <p:sldTgt/>
+                  </p:tgtEl>
+                </p:cond>
+              </p:nextCondLst>
+            </p:seq>
+          </p:childTnLst>
+        </p:cTn>
+      </p:par>
+    </p:tnLst>
+    <p:bldLst>
+      <p:bldP spid="2" grpId="0"/>
+      <p:bldP spid="5" grpId="0"/>
+    </p:bldLst>
+  </p:timing>
 </p:sld>
 </file>
 
@@ -7803,6 +8056,946 @@
 </file>
 
 <file path=ppt/slides/slide20.xml><?xml version="1.0" encoding="utf-8"?>
+<p:sld xmlns:a="http://schemas.openxmlformats.org/drawingml/2006/main" xmlns:r="http://schemas.openxmlformats.org/officeDocument/2006/relationships" xmlns:p="http://schemas.openxmlformats.org/presentationml/2006/main">
+  <p:cSld>
+    <p:spTree>
+      <p:nvGrpSpPr>
+        <p:cNvPr id="1" name=""/>
+        <p:cNvGrpSpPr/>
+        <p:nvPr/>
+      </p:nvGrpSpPr>
+      <p:grpSpPr>
+        <a:xfrm>
+          <a:off x="0" y="0"/>
+          <a:ext cx="0" cy="0"/>
+          <a:chOff x="0" y="0"/>
+          <a:chExt cx="0" cy="0"/>
+        </a:xfrm>
+      </p:grpSpPr>
+      <p:sp>
+        <p:nvSpPr>
+          <p:cNvPr id="3" name="文本框 2">
+            <a:extLst>
+              <a:ext uri="{FF2B5EF4-FFF2-40B4-BE49-F238E27FC236}">
+                <a16:creationId xmlns:a16="http://schemas.microsoft.com/office/drawing/2014/main" id="{C065B930-D3BB-49C2-A54A-5AE642688FEC}"/>
+              </a:ext>
+            </a:extLst>
+          </p:cNvPr>
+          <p:cNvSpPr txBox="1"/>
+          <p:nvPr/>
+        </p:nvSpPr>
+        <p:spPr>
+          <a:xfrm>
+            <a:off x="452761" y="838031"/>
+            <a:ext cx="4864963" cy="369332"/>
+          </a:xfrm>
+          <a:prstGeom prst="rect">
+            <a:avLst/>
+          </a:prstGeom>
+          <a:noFill/>
+        </p:spPr>
+        <p:txBody>
+          <a:bodyPr wrap="square" rtlCol="0">
+            <a:spAutoFit/>
+          </a:bodyPr>
+          <a:lstStyle/>
+          <a:p>
+            <a:r>
+              <a:rPr lang="zh-CN" altLang="en-US" dirty="0"/>
+              <a:t>各项功能：</a:t>
+            </a:r>
+          </a:p>
+        </p:txBody>
+      </p:sp>
+      <p:sp>
+        <p:nvSpPr>
+          <p:cNvPr id="4" name="文本框 3">
+            <a:extLst>
+              <a:ext uri="{FF2B5EF4-FFF2-40B4-BE49-F238E27FC236}">
+                <a16:creationId xmlns:a16="http://schemas.microsoft.com/office/drawing/2014/main" id="{56893B5B-D861-4F42-954D-66846B91B9FD}"/>
+              </a:ext>
+            </a:extLst>
+          </p:cNvPr>
+          <p:cNvSpPr txBox="1"/>
+          <p:nvPr/>
+        </p:nvSpPr>
+        <p:spPr>
+          <a:xfrm>
+            <a:off x="452760" y="1274411"/>
+            <a:ext cx="4864963" cy="369332"/>
+          </a:xfrm>
+          <a:prstGeom prst="rect">
+            <a:avLst/>
+          </a:prstGeom>
+          <a:noFill/>
+        </p:spPr>
+        <p:txBody>
+          <a:bodyPr wrap="square" rtlCol="0">
+            <a:spAutoFit/>
+          </a:bodyPr>
+          <a:lstStyle/>
+          <a:p>
+            <a:r>
+              <a:rPr lang="en-US" altLang="zh-CN" dirty="0"/>
+              <a:t>pause id</a:t>
+            </a:r>
+            <a:r>
+              <a:rPr lang="zh-CN" altLang="en-US" dirty="0"/>
+              <a:t>：暂停目标进程。</a:t>
+            </a:r>
+          </a:p>
+        </p:txBody>
+      </p:sp>
+      <p:sp>
+        <p:nvSpPr>
+          <p:cNvPr id="8" name="文本框 7">
+            <a:extLst>
+              <a:ext uri="{FF2B5EF4-FFF2-40B4-BE49-F238E27FC236}">
+                <a16:creationId xmlns:a16="http://schemas.microsoft.com/office/drawing/2014/main" id="{2E6C934C-4D92-4F80-93F2-88AFD0B474BD}"/>
+              </a:ext>
+            </a:extLst>
+          </p:cNvPr>
+          <p:cNvSpPr txBox="1"/>
+          <p:nvPr/>
+        </p:nvSpPr>
+        <p:spPr>
+          <a:xfrm>
+            <a:off x="452760" y="4088153"/>
+            <a:ext cx="5894773" cy="369332"/>
+          </a:xfrm>
+          <a:prstGeom prst="rect">
+            <a:avLst/>
+          </a:prstGeom>
+          <a:noFill/>
+        </p:spPr>
+        <p:txBody>
+          <a:bodyPr wrap="square" rtlCol="0">
+            <a:spAutoFit/>
+          </a:bodyPr>
+          <a:lstStyle/>
+          <a:p>
+            <a:r>
+              <a:rPr lang="en-US" altLang="zh-CN" dirty="0"/>
+              <a:t>start id</a:t>
+            </a:r>
+            <a:r>
+              <a:rPr lang="zh-CN" altLang="en-US" dirty="0"/>
+              <a:t>：启动目标进程。</a:t>
+            </a:r>
+          </a:p>
+        </p:txBody>
+      </p:sp>
+      <p:pic>
+        <p:nvPicPr>
+          <p:cNvPr id="10" name="图片 9">
+            <a:extLst>
+              <a:ext uri="{FF2B5EF4-FFF2-40B4-BE49-F238E27FC236}">
+                <a16:creationId xmlns:a16="http://schemas.microsoft.com/office/drawing/2014/main" id="{81D83222-1A33-4CA1-9425-BDB7F99B407C}"/>
+              </a:ext>
+            </a:extLst>
+          </p:cNvPr>
+          <p:cNvPicPr>
+            <a:picLocks noChangeAspect="1"/>
+          </p:cNvPicPr>
+          <p:nvPr/>
+        </p:nvPicPr>
+        <p:blipFill>
+          <a:blip r:embed="rId2">
+            <a:extLst>
+              <a:ext uri="{28A0092B-C50C-407E-A947-70E740481C1C}">
+                <a14:useLocalDpi xmlns:a14="http://schemas.microsoft.com/office/drawing/2010/main" val="0"/>
+              </a:ext>
+            </a:extLst>
+          </a:blip>
+          <a:stretch>
+            <a:fillRect/>
+          </a:stretch>
+        </p:blipFill>
+        <p:spPr>
+          <a:xfrm>
+            <a:off x="3833490" y="3776579"/>
+            <a:ext cx="6877050" cy="2686050"/>
+          </a:xfrm>
+          <a:prstGeom prst="rect">
+            <a:avLst/>
+          </a:prstGeom>
+        </p:spPr>
+      </p:pic>
+      <p:pic>
+        <p:nvPicPr>
+          <p:cNvPr id="12" name="图片 11">
+            <a:extLst>
+              <a:ext uri="{FF2B5EF4-FFF2-40B4-BE49-F238E27FC236}">
+                <a16:creationId xmlns:a16="http://schemas.microsoft.com/office/drawing/2014/main" id="{1897E240-9D39-4B24-B03D-838A8520106C}"/>
+              </a:ext>
+            </a:extLst>
+          </p:cNvPr>
+          <p:cNvPicPr>
+            <a:picLocks noChangeAspect="1"/>
+          </p:cNvPicPr>
+          <p:nvPr/>
+        </p:nvPicPr>
+        <p:blipFill>
+          <a:blip r:embed="rId3">
+            <a:extLst>
+              <a:ext uri="{28A0092B-C50C-407E-A947-70E740481C1C}">
+                <a14:useLocalDpi xmlns:a14="http://schemas.microsoft.com/office/drawing/2010/main" val="0"/>
+              </a:ext>
+            </a:extLst>
+          </a:blip>
+          <a:stretch>
+            <a:fillRect/>
+          </a:stretch>
+        </p:blipFill>
+        <p:spPr>
+          <a:xfrm>
+            <a:off x="3823965" y="928771"/>
+            <a:ext cx="6886575" cy="2590800"/>
+          </a:xfrm>
+          <a:prstGeom prst="rect">
+            <a:avLst/>
+          </a:prstGeom>
+        </p:spPr>
+      </p:pic>
+    </p:spTree>
+    <p:extLst>
+      <p:ext uri="{BB962C8B-B14F-4D97-AF65-F5344CB8AC3E}">
+        <p14:creationId xmlns:p14="http://schemas.microsoft.com/office/powerpoint/2010/main" val="2732374593"/>
+      </p:ext>
+    </p:extLst>
+  </p:cSld>
+  <p:clrMapOvr>
+    <a:masterClrMapping/>
+  </p:clrMapOvr>
+  <p:timing>
+    <p:tnLst>
+      <p:par>
+        <p:cTn id="1" dur="indefinite" restart="never" nodeType="tmRoot">
+          <p:childTnLst>
+            <p:seq concurrent="1" nextAc="seek">
+              <p:cTn id="2" dur="indefinite" nodeType="mainSeq">
+                <p:childTnLst>
+                  <p:par>
+                    <p:cTn id="3" fill="hold">
+                      <p:stCondLst>
+                        <p:cond delay="indefinite"/>
+                      </p:stCondLst>
+                      <p:childTnLst>
+                        <p:par>
+                          <p:cTn id="4" fill="hold">
+                            <p:stCondLst>
+                              <p:cond delay="0"/>
+                            </p:stCondLst>
+                            <p:childTnLst>
+                              <p:par>
+                                <p:cTn id="5" presetID="10" presetClass="entr" presetSubtype="0" fill="hold" grpId="0" nodeType="clickEffect">
+                                  <p:stCondLst>
+                                    <p:cond delay="0"/>
+                                  </p:stCondLst>
+                                  <p:childTnLst>
+                                    <p:set>
+                                      <p:cBhvr>
+                                        <p:cTn id="6" dur="1" fill="hold">
+                                          <p:stCondLst>
+                                            <p:cond delay="0"/>
+                                          </p:stCondLst>
+                                        </p:cTn>
+                                        <p:tgtEl>
+                                          <p:spTgt spid="3"/>
+                                        </p:tgtEl>
+                                        <p:attrNameLst>
+                                          <p:attrName>style.visibility</p:attrName>
+                                        </p:attrNameLst>
+                                      </p:cBhvr>
+                                      <p:to>
+                                        <p:strVal val="visible"/>
+                                      </p:to>
+                                    </p:set>
+                                    <p:animEffect transition="in" filter="fade">
+                                      <p:cBhvr>
+                                        <p:cTn id="7" dur="500"/>
+                                        <p:tgtEl>
+                                          <p:spTgt spid="3"/>
+                                        </p:tgtEl>
+                                      </p:cBhvr>
+                                    </p:animEffect>
+                                  </p:childTnLst>
+                                </p:cTn>
+                              </p:par>
+                            </p:childTnLst>
+                          </p:cTn>
+                        </p:par>
+                      </p:childTnLst>
+                    </p:cTn>
+                  </p:par>
+                  <p:par>
+                    <p:cTn id="8" fill="hold">
+                      <p:stCondLst>
+                        <p:cond delay="indefinite"/>
+                      </p:stCondLst>
+                      <p:childTnLst>
+                        <p:par>
+                          <p:cTn id="9" fill="hold">
+                            <p:stCondLst>
+                              <p:cond delay="0"/>
+                            </p:stCondLst>
+                            <p:childTnLst>
+                              <p:par>
+                                <p:cTn id="10" presetID="10" presetClass="entr" presetSubtype="0" fill="hold" grpId="0" nodeType="clickEffect">
+                                  <p:stCondLst>
+                                    <p:cond delay="0"/>
+                                  </p:stCondLst>
+                                  <p:childTnLst>
+                                    <p:set>
+                                      <p:cBhvr>
+                                        <p:cTn id="11" dur="1" fill="hold">
+                                          <p:stCondLst>
+                                            <p:cond delay="0"/>
+                                          </p:stCondLst>
+                                        </p:cTn>
+                                        <p:tgtEl>
+                                          <p:spTgt spid="4"/>
+                                        </p:tgtEl>
+                                        <p:attrNameLst>
+                                          <p:attrName>style.visibility</p:attrName>
+                                        </p:attrNameLst>
+                                      </p:cBhvr>
+                                      <p:to>
+                                        <p:strVal val="visible"/>
+                                      </p:to>
+                                    </p:set>
+                                    <p:animEffect transition="in" filter="fade">
+                                      <p:cBhvr>
+                                        <p:cTn id="12" dur="500"/>
+                                        <p:tgtEl>
+                                          <p:spTgt spid="4"/>
+                                        </p:tgtEl>
+                                      </p:cBhvr>
+                                    </p:animEffect>
+                                  </p:childTnLst>
+                                </p:cTn>
+                              </p:par>
+                            </p:childTnLst>
+                          </p:cTn>
+                        </p:par>
+                      </p:childTnLst>
+                    </p:cTn>
+                  </p:par>
+                  <p:par>
+                    <p:cTn id="13" fill="hold">
+                      <p:stCondLst>
+                        <p:cond delay="indefinite"/>
+                      </p:stCondLst>
+                      <p:childTnLst>
+                        <p:par>
+                          <p:cTn id="14" fill="hold">
+                            <p:stCondLst>
+                              <p:cond delay="0"/>
+                            </p:stCondLst>
+                            <p:childTnLst>
+                              <p:par>
+                                <p:cTn id="15" presetID="10" presetClass="entr" presetSubtype="0" fill="hold" nodeType="clickEffect">
+                                  <p:stCondLst>
+                                    <p:cond delay="0"/>
+                                  </p:stCondLst>
+                                  <p:childTnLst>
+                                    <p:set>
+                                      <p:cBhvr>
+                                        <p:cTn id="16" dur="1" fill="hold">
+                                          <p:stCondLst>
+                                            <p:cond delay="0"/>
+                                          </p:stCondLst>
+                                        </p:cTn>
+                                        <p:tgtEl>
+                                          <p:spTgt spid="8">
+                                            <p:txEl>
+                                              <p:pRg st="0" end="0"/>
+                                            </p:txEl>
+                                          </p:spTgt>
+                                        </p:tgtEl>
+                                        <p:attrNameLst>
+                                          <p:attrName>style.visibility</p:attrName>
+                                        </p:attrNameLst>
+                                      </p:cBhvr>
+                                      <p:to>
+                                        <p:strVal val="visible"/>
+                                      </p:to>
+                                    </p:set>
+                                    <p:animEffect transition="in" filter="fade">
+                                      <p:cBhvr>
+                                        <p:cTn id="17" dur="500"/>
+                                        <p:tgtEl>
+                                          <p:spTgt spid="8">
+                                            <p:txEl>
+                                              <p:pRg st="0" end="0"/>
+                                            </p:txEl>
+                                          </p:spTgt>
+                                        </p:tgtEl>
+                                      </p:cBhvr>
+                                    </p:animEffect>
+                                  </p:childTnLst>
+                                </p:cTn>
+                              </p:par>
+                            </p:childTnLst>
+                          </p:cTn>
+                        </p:par>
+                      </p:childTnLst>
+                    </p:cTn>
+                  </p:par>
+                </p:childTnLst>
+              </p:cTn>
+              <p:prevCondLst>
+                <p:cond evt="onPrev" delay="0">
+                  <p:tgtEl>
+                    <p:sldTgt/>
+                  </p:tgtEl>
+                </p:cond>
+              </p:prevCondLst>
+              <p:nextCondLst>
+                <p:cond evt="onNext" delay="0">
+                  <p:tgtEl>
+                    <p:sldTgt/>
+                  </p:tgtEl>
+                </p:cond>
+              </p:nextCondLst>
+            </p:seq>
+          </p:childTnLst>
+        </p:cTn>
+      </p:par>
+    </p:tnLst>
+    <p:bldLst>
+      <p:bldP spid="3" grpId="0"/>
+      <p:bldP spid="4" grpId="0"/>
+    </p:bldLst>
+  </p:timing>
+</p:sld>
+</file>
+
+<file path=ppt/slides/slide21.xml><?xml version="1.0" encoding="utf-8"?>
+<p:sld xmlns:a="http://schemas.openxmlformats.org/drawingml/2006/main" xmlns:r="http://schemas.openxmlformats.org/officeDocument/2006/relationships" xmlns:p="http://schemas.openxmlformats.org/presentationml/2006/main">
+  <p:cSld>
+    <p:spTree>
+      <p:nvGrpSpPr>
+        <p:cNvPr id="1" name=""/>
+        <p:cNvGrpSpPr/>
+        <p:nvPr/>
+      </p:nvGrpSpPr>
+      <p:grpSpPr>
+        <a:xfrm>
+          <a:off x="0" y="0"/>
+          <a:ext cx="0" cy="0"/>
+          <a:chOff x="0" y="0"/>
+          <a:chExt cx="0" cy="0"/>
+        </a:xfrm>
+      </p:grpSpPr>
+      <p:sp>
+        <p:nvSpPr>
+          <p:cNvPr id="3" name="文本框 2">
+            <a:extLst>
+              <a:ext uri="{FF2B5EF4-FFF2-40B4-BE49-F238E27FC236}">
+                <a16:creationId xmlns:a16="http://schemas.microsoft.com/office/drawing/2014/main" id="{C065B930-D3BB-49C2-A54A-5AE642688FEC}"/>
+              </a:ext>
+            </a:extLst>
+          </p:cNvPr>
+          <p:cNvSpPr txBox="1"/>
+          <p:nvPr/>
+        </p:nvSpPr>
+        <p:spPr>
+          <a:xfrm>
+            <a:off x="452761" y="838031"/>
+            <a:ext cx="4864963" cy="369332"/>
+          </a:xfrm>
+          <a:prstGeom prst="rect">
+            <a:avLst/>
+          </a:prstGeom>
+          <a:noFill/>
+        </p:spPr>
+        <p:txBody>
+          <a:bodyPr wrap="square" rtlCol="0">
+            <a:spAutoFit/>
+          </a:bodyPr>
+          <a:lstStyle/>
+          <a:p>
+            <a:r>
+              <a:rPr lang="zh-CN" altLang="en-US" dirty="0"/>
+              <a:t>各项功能：</a:t>
+            </a:r>
+          </a:p>
+        </p:txBody>
+      </p:sp>
+      <p:sp>
+        <p:nvSpPr>
+          <p:cNvPr id="16" name="文本框 15">
+            <a:extLst>
+              <a:ext uri="{FF2B5EF4-FFF2-40B4-BE49-F238E27FC236}">
+                <a16:creationId xmlns:a16="http://schemas.microsoft.com/office/drawing/2014/main" id="{87C762E3-74F5-4108-B70B-3C77BEF78BFB}"/>
+              </a:ext>
+            </a:extLst>
+          </p:cNvPr>
+          <p:cNvSpPr txBox="1"/>
+          <p:nvPr/>
+        </p:nvSpPr>
+        <p:spPr>
+          <a:xfrm>
+            <a:off x="452759" y="1536145"/>
+            <a:ext cx="3036163" cy="369332"/>
+          </a:xfrm>
+          <a:prstGeom prst="rect">
+            <a:avLst/>
+          </a:prstGeom>
+          <a:noFill/>
+        </p:spPr>
+        <p:txBody>
+          <a:bodyPr wrap="square" rtlCol="0">
+            <a:spAutoFit/>
+          </a:bodyPr>
+          <a:lstStyle/>
+          <a:p>
+            <a:r>
+              <a:rPr lang="en-US" altLang="zh-CN" dirty="0"/>
+              <a:t>kill id</a:t>
+            </a:r>
+            <a:r>
+              <a:rPr lang="zh-CN" altLang="en-US" dirty="0"/>
+              <a:t>：结束目标进程。</a:t>
+            </a:r>
+          </a:p>
+        </p:txBody>
+      </p:sp>
+      <p:sp>
+        <p:nvSpPr>
+          <p:cNvPr id="19" name="文本框 18">
+            <a:extLst>
+              <a:ext uri="{FF2B5EF4-FFF2-40B4-BE49-F238E27FC236}">
+                <a16:creationId xmlns:a16="http://schemas.microsoft.com/office/drawing/2014/main" id="{9471D84D-0E67-4070-87A0-478D077D60D2}"/>
+              </a:ext>
+            </a:extLst>
+          </p:cNvPr>
+          <p:cNvSpPr txBox="1"/>
+          <p:nvPr/>
+        </p:nvSpPr>
+        <p:spPr>
+          <a:xfrm>
+            <a:off x="452758" y="4490859"/>
+            <a:ext cx="5566301" cy="923330"/>
+          </a:xfrm>
+          <a:prstGeom prst="rect">
+            <a:avLst/>
+          </a:prstGeom>
+          <a:noFill/>
+        </p:spPr>
+        <p:txBody>
+          <a:bodyPr wrap="square" rtlCol="0">
+            <a:spAutoFit/>
+          </a:bodyPr>
+          <a:lstStyle/>
+          <a:p>
+            <a:r>
+              <a:rPr lang="en-US" altLang="zh-CN" dirty="0"/>
+              <a:t>exit</a:t>
+            </a:r>
+            <a:r>
+              <a:rPr lang="zh-CN" altLang="en-US" dirty="0"/>
+              <a:t>：退出进程管理系统。</a:t>
+            </a:r>
+            <a:endParaRPr lang="en-US" altLang="zh-CN" dirty="0"/>
+          </a:p>
+          <a:p>
+            <a:endParaRPr lang="en-US" altLang="zh-CN" dirty="0"/>
+          </a:p>
+          <a:p>
+            <a:r>
+              <a:rPr lang="en-US" altLang="zh-CN" dirty="0"/>
+              <a:t>clear</a:t>
+            </a:r>
+            <a:r>
+              <a:rPr lang="zh-CN" altLang="en-US" dirty="0"/>
+              <a:t>：清空屏幕当前内容。</a:t>
+            </a:r>
+          </a:p>
+        </p:txBody>
+      </p:sp>
+      <p:pic>
+        <p:nvPicPr>
+          <p:cNvPr id="7" name="图片 6">
+            <a:extLst>
+              <a:ext uri="{FF2B5EF4-FFF2-40B4-BE49-F238E27FC236}">
+                <a16:creationId xmlns:a16="http://schemas.microsoft.com/office/drawing/2014/main" id="{D82A4BBB-7CDB-4D07-92BC-D845193F573B}"/>
+              </a:ext>
+            </a:extLst>
+          </p:cNvPr>
+          <p:cNvPicPr>
+            <a:picLocks noChangeAspect="1"/>
+          </p:cNvPicPr>
+          <p:nvPr/>
+        </p:nvPicPr>
+        <p:blipFill>
+          <a:blip r:embed="rId2">
+            <a:extLst>
+              <a:ext uri="{28A0092B-C50C-407E-A947-70E740481C1C}">
+                <a14:useLocalDpi xmlns:a14="http://schemas.microsoft.com/office/drawing/2010/main" val="0"/>
+              </a:ext>
+            </a:extLst>
+          </a:blip>
+          <a:stretch>
+            <a:fillRect/>
+          </a:stretch>
+        </p:blipFill>
+        <p:spPr>
+          <a:xfrm>
+            <a:off x="3235908" y="1354345"/>
+            <a:ext cx="6838950" cy="2438400"/>
+          </a:xfrm>
+          <a:prstGeom prst="rect">
+            <a:avLst/>
+          </a:prstGeom>
+        </p:spPr>
+      </p:pic>
+    </p:spTree>
+    <p:extLst>
+      <p:ext uri="{BB962C8B-B14F-4D97-AF65-F5344CB8AC3E}">
+        <p14:creationId xmlns:p14="http://schemas.microsoft.com/office/powerpoint/2010/main" val="430958541"/>
+      </p:ext>
+    </p:extLst>
+  </p:cSld>
+  <p:clrMapOvr>
+    <a:masterClrMapping/>
+  </p:clrMapOvr>
+  <p:timing>
+    <p:tnLst>
+      <p:par>
+        <p:cTn id="1" dur="indefinite" restart="never" nodeType="tmRoot">
+          <p:childTnLst>
+            <p:seq concurrent="1" nextAc="seek">
+              <p:cTn id="2" dur="indefinite" nodeType="mainSeq">
+                <p:childTnLst>
+                  <p:par>
+                    <p:cTn id="3" fill="hold">
+                      <p:stCondLst>
+                        <p:cond delay="indefinite"/>
+                      </p:stCondLst>
+                      <p:childTnLst>
+                        <p:par>
+                          <p:cTn id="4" fill="hold">
+                            <p:stCondLst>
+                              <p:cond delay="0"/>
+                            </p:stCondLst>
+                            <p:childTnLst>
+                              <p:par>
+                                <p:cTn id="5" presetID="10" presetClass="entr" presetSubtype="0" fill="hold" grpId="0" nodeType="clickEffect">
+                                  <p:stCondLst>
+                                    <p:cond delay="0"/>
+                                  </p:stCondLst>
+                                  <p:childTnLst>
+                                    <p:set>
+                                      <p:cBhvr>
+                                        <p:cTn id="6" dur="1" fill="hold">
+                                          <p:stCondLst>
+                                            <p:cond delay="0"/>
+                                          </p:stCondLst>
+                                        </p:cTn>
+                                        <p:tgtEl>
+                                          <p:spTgt spid="3"/>
+                                        </p:tgtEl>
+                                        <p:attrNameLst>
+                                          <p:attrName>style.visibility</p:attrName>
+                                        </p:attrNameLst>
+                                      </p:cBhvr>
+                                      <p:to>
+                                        <p:strVal val="visible"/>
+                                      </p:to>
+                                    </p:set>
+                                    <p:animEffect transition="in" filter="fade">
+                                      <p:cBhvr>
+                                        <p:cTn id="7" dur="500"/>
+                                        <p:tgtEl>
+                                          <p:spTgt spid="3"/>
+                                        </p:tgtEl>
+                                      </p:cBhvr>
+                                    </p:animEffect>
+                                  </p:childTnLst>
+                                </p:cTn>
+                              </p:par>
+                            </p:childTnLst>
+                          </p:cTn>
+                        </p:par>
+                      </p:childTnLst>
+                    </p:cTn>
+                  </p:par>
+                  <p:par>
+                    <p:cTn id="8" fill="hold">
+                      <p:stCondLst>
+                        <p:cond delay="indefinite"/>
+                      </p:stCondLst>
+                      <p:childTnLst>
+                        <p:par>
+                          <p:cTn id="9" fill="hold">
+                            <p:stCondLst>
+                              <p:cond delay="0"/>
+                            </p:stCondLst>
+                            <p:childTnLst>
+                              <p:par>
+                                <p:cTn id="10" presetID="10" presetClass="entr" presetSubtype="0" fill="hold" nodeType="clickEffect">
+                                  <p:stCondLst>
+                                    <p:cond delay="0"/>
+                                  </p:stCondLst>
+                                  <p:childTnLst>
+                                    <p:set>
+                                      <p:cBhvr>
+                                        <p:cTn id="11" dur="1" fill="hold">
+                                          <p:stCondLst>
+                                            <p:cond delay="0"/>
+                                          </p:stCondLst>
+                                        </p:cTn>
+                                        <p:tgtEl>
+                                          <p:spTgt spid="16">
+                                            <p:txEl>
+                                              <p:pRg st="0" end="0"/>
+                                            </p:txEl>
+                                          </p:spTgt>
+                                        </p:tgtEl>
+                                        <p:attrNameLst>
+                                          <p:attrName>style.visibility</p:attrName>
+                                        </p:attrNameLst>
+                                      </p:cBhvr>
+                                      <p:to>
+                                        <p:strVal val="visible"/>
+                                      </p:to>
+                                    </p:set>
+                                    <p:animEffect transition="in" filter="fade">
+                                      <p:cBhvr>
+                                        <p:cTn id="12" dur="500"/>
+                                        <p:tgtEl>
+                                          <p:spTgt spid="16">
+                                            <p:txEl>
+                                              <p:pRg st="0" end="0"/>
+                                            </p:txEl>
+                                          </p:spTgt>
+                                        </p:tgtEl>
+                                      </p:cBhvr>
+                                    </p:animEffect>
+                                  </p:childTnLst>
+                                </p:cTn>
+                              </p:par>
+                            </p:childTnLst>
+                          </p:cTn>
+                        </p:par>
+                      </p:childTnLst>
+                    </p:cTn>
+                  </p:par>
+                  <p:par>
+                    <p:cTn id="13" fill="hold">
+                      <p:stCondLst>
+                        <p:cond delay="indefinite"/>
+                      </p:stCondLst>
+                      <p:childTnLst>
+                        <p:par>
+                          <p:cTn id="14" fill="hold">
+                            <p:stCondLst>
+                              <p:cond delay="0"/>
+                            </p:stCondLst>
+                            <p:childTnLst>
+                              <p:par>
+                                <p:cTn id="15" presetID="10" presetClass="entr" presetSubtype="0" fill="hold" nodeType="clickEffect">
+                                  <p:stCondLst>
+                                    <p:cond delay="0"/>
+                                  </p:stCondLst>
+                                  <p:childTnLst>
+                                    <p:set>
+                                      <p:cBhvr>
+                                        <p:cTn id="16" dur="1" fill="hold">
+                                          <p:stCondLst>
+                                            <p:cond delay="0"/>
+                                          </p:stCondLst>
+                                        </p:cTn>
+                                        <p:tgtEl>
+                                          <p:spTgt spid="19">
+                                            <p:txEl>
+                                              <p:pRg st="0" end="0"/>
+                                            </p:txEl>
+                                          </p:spTgt>
+                                        </p:tgtEl>
+                                        <p:attrNameLst>
+                                          <p:attrName>style.visibility</p:attrName>
+                                        </p:attrNameLst>
+                                      </p:cBhvr>
+                                      <p:to>
+                                        <p:strVal val="visible"/>
+                                      </p:to>
+                                    </p:set>
+                                    <p:animEffect transition="in" filter="fade">
+                                      <p:cBhvr>
+                                        <p:cTn id="17" dur="500"/>
+                                        <p:tgtEl>
+                                          <p:spTgt spid="19">
+                                            <p:txEl>
+                                              <p:pRg st="0" end="0"/>
+                                            </p:txEl>
+                                          </p:spTgt>
+                                        </p:tgtEl>
+                                      </p:cBhvr>
+                                    </p:animEffect>
+                                  </p:childTnLst>
+                                </p:cTn>
+                              </p:par>
+                            </p:childTnLst>
+                          </p:cTn>
+                        </p:par>
+                      </p:childTnLst>
+                    </p:cTn>
+                  </p:par>
+                  <p:par>
+                    <p:cTn id="18" fill="hold">
+                      <p:stCondLst>
+                        <p:cond delay="indefinite"/>
+                      </p:stCondLst>
+                      <p:childTnLst>
+                        <p:par>
+                          <p:cTn id="19" fill="hold">
+                            <p:stCondLst>
+                              <p:cond delay="0"/>
+                            </p:stCondLst>
+                            <p:childTnLst>
+                              <p:par>
+                                <p:cTn id="20" presetID="10" presetClass="entr" presetSubtype="0" fill="hold" nodeType="clickEffect">
+                                  <p:stCondLst>
+                                    <p:cond delay="0"/>
+                                  </p:stCondLst>
+                                  <p:childTnLst>
+                                    <p:set>
+                                      <p:cBhvr>
+                                        <p:cTn id="21" dur="1" fill="hold">
+                                          <p:stCondLst>
+                                            <p:cond delay="0"/>
+                                          </p:stCondLst>
+                                        </p:cTn>
+                                        <p:tgtEl>
+                                          <p:spTgt spid="19">
+                                            <p:txEl>
+                                              <p:pRg st="2" end="2"/>
+                                            </p:txEl>
+                                          </p:spTgt>
+                                        </p:tgtEl>
+                                        <p:attrNameLst>
+                                          <p:attrName>style.visibility</p:attrName>
+                                        </p:attrNameLst>
+                                      </p:cBhvr>
+                                      <p:to>
+                                        <p:strVal val="visible"/>
+                                      </p:to>
+                                    </p:set>
+                                    <p:animEffect transition="in" filter="fade">
+                                      <p:cBhvr>
+                                        <p:cTn id="22" dur="500"/>
+                                        <p:tgtEl>
+                                          <p:spTgt spid="19">
+                                            <p:txEl>
+                                              <p:pRg st="2" end="2"/>
+                                            </p:txEl>
+                                          </p:spTgt>
+                                        </p:tgtEl>
+                                      </p:cBhvr>
+                                    </p:animEffect>
+                                  </p:childTnLst>
+                                </p:cTn>
+                              </p:par>
+                            </p:childTnLst>
+                          </p:cTn>
+                        </p:par>
+                      </p:childTnLst>
+                    </p:cTn>
+                  </p:par>
+                </p:childTnLst>
+              </p:cTn>
+              <p:prevCondLst>
+                <p:cond evt="onPrev" delay="0">
+                  <p:tgtEl>
+                    <p:sldTgt/>
+                  </p:tgtEl>
+                </p:cond>
+              </p:prevCondLst>
+              <p:nextCondLst>
+                <p:cond evt="onNext" delay="0">
+                  <p:tgtEl>
+                    <p:sldTgt/>
+                  </p:tgtEl>
+                </p:cond>
+              </p:nextCondLst>
+            </p:seq>
+          </p:childTnLst>
+        </p:cTn>
+      </p:par>
+    </p:tnLst>
+    <p:bldLst>
+      <p:bldP spid="3" grpId="0"/>
+    </p:bldLst>
+  </p:timing>
+</p:sld>
+</file>
+
+<file path=ppt/slides/slide22.xml><?xml version="1.0" encoding="utf-8"?>
+<p:sld xmlns:a="http://schemas.openxmlformats.org/drawingml/2006/main" xmlns:r="http://schemas.openxmlformats.org/officeDocument/2006/relationships" xmlns:p="http://schemas.openxmlformats.org/presentationml/2006/main">
+  <p:cSld>
+    <p:spTree>
+      <p:nvGrpSpPr>
+        <p:cNvPr id="1" name=""/>
+        <p:cNvGrpSpPr/>
+        <p:nvPr/>
+      </p:nvGrpSpPr>
+      <p:grpSpPr>
+        <a:xfrm>
+          <a:off x="0" y="0"/>
+          <a:ext cx="0" cy="0"/>
+          <a:chOff x="0" y="0"/>
+          <a:chExt cx="0" cy="0"/>
+        </a:xfrm>
+      </p:grpSpPr>
+      <p:sp>
+        <p:nvSpPr>
+          <p:cNvPr id="2" name="标题 1">
+            <a:extLst>
+              <a:ext uri="{FF2B5EF4-FFF2-40B4-BE49-F238E27FC236}">
+                <a16:creationId xmlns:a16="http://schemas.microsoft.com/office/drawing/2014/main" id="{944B6395-522D-4E7B-8C66-A03B077A9030}"/>
+              </a:ext>
+            </a:extLst>
+          </p:cNvPr>
+          <p:cNvSpPr>
+            <a:spLocks noGrp="1"/>
+          </p:cNvSpPr>
+          <p:nvPr>
+            <p:ph type="title"/>
+          </p:nvPr>
+        </p:nvSpPr>
+        <p:spPr/>
+        <p:txBody>
+          <a:bodyPr/>
+          <a:lstStyle/>
+          <a:p>
+            <a:r>
+              <a:rPr lang="en-US" altLang="zh-CN" sz="5400" dirty="0"/>
+              <a:t>Part 3 – </a:t>
+            </a:r>
+            <a:r>
+              <a:rPr lang="zh-CN" altLang="en-US" sz="5400" dirty="0"/>
+              <a:t>用户及应用的演示、实现和说明</a:t>
+            </a:r>
+          </a:p>
+        </p:txBody>
+      </p:sp>
+    </p:spTree>
+    <p:extLst>
+      <p:ext uri="{BB962C8B-B14F-4D97-AF65-F5344CB8AC3E}">
+        <p14:creationId xmlns:p14="http://schemas.microsoft.com/office/powerpoint/2010/main" val="2129066617"/>
+      </p:ext>
+    </p:extLst>
+  </p:cSld>
+  <p:clrMapOvr>
+    <a:masterClrMapping/>
+  </p:clrMapOvr>
+</p:sld>
+</file>
+
+<file path=ppt/slides/slide23.xml><?xml version="1.0" encoding="utf-8"?>
 <p:sld xmlns:a="http://schemas.openxmlformats.org/drawingml/2006/main" xmlns:r="http://schemas.openxmlformats.org/officeDocument/2006/relationships" xmlns:p="http://schemas.openxmlformats.org/presentationml/2006/main">
   <p:cSld>
     <p:spTree>
@@ -8151,7 +9344,7 @@
 </p:sld>
 </file>
 
-<file path=ppt/slides/slide21.xml><?xml version="1.0" encoding="utf-8"?>
+<file path=ppt/slides/slide24.xml><?xml version="1.0" encoding="utf-8"?>
 <p:sld xmlns:a="http://schemas.openxmlformats.org/drawingml/2006/main" xmlns:r="http://schemas.openxmlformats.org/officeDocument/2006/relationships" xmlns:p="http://schemas.openxmlformats.org/presentationml/2006/main">
   <p:cSld>
     <p:spTree>
@@ -9053,7 +10246,7 @@
 </p:sld>
 </file>
 
-<file path=ppt/slides/slide22.xml><?xml version="1.0" encoding="utf-8"?>
+<file path=ppt/slides/slide25.xml><?xml version="1.0" encoding="utf-8"?>
 <p:sld xmlns:a="http://schemas.openxmlformats.org/drawingml/2006/main" xmlns:r="http://schemas.openxmlformats.org/officeDocument/2006/relationships" xmlns:p="http://schemas.openxmlformats.org/presentationml/2006/main">
   <p:cSld>
     <p:spTree>
@@ -9598,6 +10791,955 @@
 </p:sld>
 </file>
 
+<file path=ppt/slides/slide26.xml><?xml version="1.0" encoding="utf-8"?>
+<p:sld xmlns:a="http://schemas.openxmlformats.org/drawingml/2006/main" xmlns:r="http://schemas.openxmlformats.org/officeDocument/2006/relationships" xmlns:p="http://schemas.openxmlformats.org/presentationml/2006/main">
+  <p:cSld>
+    <p:spTree>
+      <p:nvGrpSpPr>
+        <p:cNvPr id="1" name=""/>
+        <p:cNvGrpSpPr/>
+        <p:nvPr/>
+      </p:nvGrpSpPr>
+      <p:grpSpPr>
+        <a:xfrm>
+          <a:off x="0" y="0"/>
+          <a:ext cx="0" cy="0"/>
+          <a:chOff x="0" y="0"/>
+          <a:chExt cx="0" cy="0"/>
+        </a:xfrm>
+      </p:grpSpPr>
+      <p:sp>
+        <p:nvSpPr>
+          <p:cNvPr id="2" name="标题 1">
+            <a:extLst>
+              <a:ext uri="{FF2B5EF4-FFF2-40B4-BE49-F238E27FC236}">
+                <a16:creationId xmlns:a16="http://schemas.microsoft.com/office/drawing/2014/main" id="{06CA617F-7B10-4BC3-9FED-F7B1D31305C3}"/>
+              </a:ext>
+            </a:extLst>
+          </p:cNvPr>
+          <p:cNvSpPr>
+            <a:spLocks noGrp="1"/>
+          </p:cNvSpPr>
+          <p:nvPr>
+            <p:ph type="title"/>
+          </p:nvPr>
+        </p:nvSpPr>
+        <p:spPr/>
+        <p:txBody>
+          <a:bodyPr/>
+          <a:lstStyle/>
+          <a:p>
+            <a:r>
+              <a:rPr lang="zh-CN" altLang="en-US" dirty="0"/>
+              <a:t>用户级应用：</a:t>
+            </a:r>
+            <a:r>
+              <a:rPr lang="en-US" altLang="zh-CN" dirty="0"/>
+              <a:t>KFC</a:t>
+            </a:r>
+            <a:endParaRPr lang="zh-CN" altLang="en-US" dirty="0"/>
+          </a:p>
+        </p:txBody>
+      </p:sp>
+      <p:sp>
+        <p:nvSpPr>
+          <p:cNvPr id="3" name="文本框 2">
+            <a:extLst>
+              <a:ext uri="{FF2B5EF4-FFF2-40B4-BE49-F238E27FC236}">
+                <a16:creationId xmlns:a16="http://schemas.microsoft.com/office/drawing/2014/main" id="{92952D33-8713-45F9-8F41-9C7D6A6D3AE5}"/>
+              </a:ext>
+            </a:extLst>
+          </p:cNvPr>
+          <p:cNvSpPr txBox="1"/>
+          <p:nvPr/>
+        </p:nvSpPr>
+        <p:spPr>
+          <a:xfrm>
+            <a:off x="5271375" y="1224680"/>
+            <a:ext cx="4715041" cy="369332"/>
+          </a:xfrm>
+          <a:prstGeom prst="rect">
+            <a:avLst/>
+          </a:prstGeom>
+          <a:noFill/>
+        </p:spPr>
+        <p:txBody>
+          <a:bodyPr wrap="square" rtlCol="0">
+            <a:spAutoFit/>
+          </a:bodyPr>
+          <a:lstStyle/>
+          <a:p>
+            <a:r>
+              <a:rPr lang="zh-CN" altLang="en-US" dirty="0"/>
+              <a:t>输入指令</a:t>
+            </a:r>
+            <a:r>
+              <a:rPr lang="en-US" altLang="zh-CN" dirty="0"/>
+              <a:t> play -KFC</a:t>
+            </a:r>
+            <a:r>
+              <a:rPr lang="zh-CN" altLang="en-US" dirty="0"/>
+              <a:t>后，即可进入本应用。</a:t>
+            </a:r>
+          </a:p>
+        </p:txBody>
+      </p:sp>
+      <p:sp>
+        <p:nvSpPr>
+          <p:cNvPr id="6" name="文本框 5">
+            <a:extLst>
+              <a:ext uri="{FF2B5EF4-FFF2-40B4-BE49-F238E27FC236}">
+                <a16:creationId xmlns:a16="http://schemas.microsoft.com/office/drawing/2014/main" id="{CF77AF00-C6D3-4BF0-BDEB-12F9576D0560}"/>
+              </a:ext>
+            </a:extLst>
+          </p:cNvPr>
+          <p:cNvSpPr txBox="1"/>
+          <p:nvPr/>
+        </p:nvSpPr>
+        <p:spPr>
+          <a:xfrm>
+            <a:off x="517870" y="3429000"/>
+            <a:ext cx="4444655" cy="1477328"/>
+          </a:xfrm>
+          <a:prstGeom prst="rect">
+            <a:avLst/>
+          </a:prstGeom>
+          <a:noFill/>
+        </p:spPr>
+        <p:txBody>
+          <a:bodyPr wrap="square" rtlCol="0">
+            <a:spAutoFit/>
+          </a:bodyPr>
+          <a:lstStyle/>
+          <a:p>
+            <a:r>
+              <a:rPr lang="zh-CN" altLang="en-US" dirty="0"/>
+              <a:t>输入点餐的指令，若正确会显示详细订单和总价格，若错误会进行提示。</a:t>
+            </a:r>
+            <a:endParaRPr lang="en-US" altLang="zh-CN" dirty="0"/>
+          </a:p>
+          <a:p>
+            <a:endParaRPr lang="en-US" altLang="zh-CN" dirty="0"/>
+          </a:p>
+          <a:p>
+            <a:r>
+              <a:rPr lang="zh-CN" altLang="en-US" dirty="0"/>
+              <a:t>点餐内容包含套餐时，会优先按照套餐的较低价格来计算总价。</a:t>
+            </a:r>
+          </a:p>
+        </p:txBody>
+      </p:sp>
+      <p:pic>
+        <p:nvPicPr>
+          <p:cNvPr id="8" name="图片 7">
+            <a:extLst>
+              <a:ext uri="{FF2B5EF4-FFF2-40B4-BE49-F238E27FC236}">
+                <a16:creationId xmlns:a16="http://schemas.microsoft.com/office/drawing/2014/main" id="{E280A4F7-C7E6-4C58-BB6B-1ACC129B4824}"/>
+              </a:ext>
+            </a:extLst>
+          </p:cNvPr>
+          <p:cNvPicPr>
+            <a:picLocks noChangeAspect="1"/>
+          </p:cNvPicPr>
+          <p:nvPr/>
+        </p:nvPicPr>
+        <p:blipFill>
+          <a:blip r:embed="rId2">
+            <a:extLst>
+              <a:ext uri="{28A0092B-C50C-407E-A947-70E740481C1C}">
+                <a14:useLocalDpi xmlns:a14="http://schemas.microsoft.com/office/drawing/2010/main" val="0"/>
+              </a:ext>
+            </a:extLst>
+          </a:blip>
+          <a:stretch>
+            <a:fillRect/>
+          </a:stretch>
+        </p:blipFill>
+        <p:spPr>
+          <a:xfrm>
+            <a:off x="5271375" y="1624739"/>
+            <a:ext cx="6308007" cy="4016599"/>
+          </a:xfrm>
+          <a:prstGeom prst="rect">
+            <a:avLst/>
+          </a:prstGeom>
+        </p:spPr>
+      </p:pic>
+    </p:spTree>
+    <p:extLst>
+      <p:ext uri="{BB962C8B-B14F-4D97-AF65-F5344CB8AC3E}">
+        <p14:creationId xmlns:p14="http://schemas.microsoft.com/office/powerpoint/2010/main" val="371934299"/>
+      </p:ext>
+    </p:extLst>
+  </p:cSld>
+  <p:clrMapOvr>
+    <a:masterClrMapping/>
+  </p:clrMapOvr>
+  <p:timing>
+    <p:tnLst>
+      <p:par>
+        <p:cTn id="1" dur="indefinite" restart="never" nodeType="tmRoot">
+          <p:childTnLst>
+            <p:seq concurrent="1" nextAc="seek">
+              <p:cTn id="2" dur="indefinite" nodeType="mainSeq">
+                <p:childTnLst>
+                  <p:par>
+                    <p:cTn id="3" fill="hold">
+                      <p:stCondLst>
+                        <p:cond delay="indefinite"/>
+                      </p:stCondLst>
+                      <p:childTnLst>
+                        <p:par>
+                          <p:cTn id="4" fill="hold">
+                            <p:stCondLst>
+                              <p:cond delay="0"/>
+                            </p:stCondLst>
+                            <p:childTnLst>
+                              <p:par>
+                                <p:cTn id="5" presetID="10" presetClass="entr" presetSubtype="0" fill="hold" grpId="0" nodeType="clickEffect">
+                                  <p:stCondLst>
+                                    <p:cond delay="0"/>
+                                  </p:stCondLst>
+                                  <p:childTnLst>
+                                    <p:set>
+                                      <p:cBhvr>
+                                        <p:cTn id="6" dur="1" fill="hold">
+                                          <p:stCondLst>
+                                            <p:cond delay="0"/>
+                                          </p:stCondLst>
+                                        </p:cTn>
+                                        <p:tgtEl>
+                                          <p:spTgt spid="2"/>
+                                        </p:tgtEl>
+                                        <p:attrNameLst>
+                                          <p:attrName>style.visibility</p:attrName>
+                                        </p:attrNameLst>
+                                      </p:cBhvr>
+                                      <p:to>
+                                        <p:strVal val="visible"/>
+                                      </p:to>
+                                    </p:set>
+                                    <p:animEffect transition="in" filter="fade">
+                                      <p:cBhvr>
+                                        <p:cTn id="7" dur="500"/>
+                                        <p:tgtEl>
+                                          <p:spTgt spid="2"/>
+                                        </p:tgtEl>
+                                      </p:cBhvr>
+                                    </p:animEffect>
+                                  </p:childTnLst>
+                                </p:cTn>
+                              </p:par>
+                            </p:childTnLst>
+                          </p:cTn>
+                        </p:par>
+                      </p:childTnLst>
+                    </p:cTn>
+                  </p:par>
+                  <p:par>
+                    <p:cTn id="8" fill="hold">
+                      <p:stCondLst>
+                        <p:cond delay="indefinite"/>
+                      </p:stCondLst>
+                      <p:childTnLst>
+                        <p:par>
+                          <p:cTn id="9" fill="hold">
+                            <p:stCondLst>
+                              <p:cond delay="0"/>
+                            </p:stCondLst>
+                            <p:childTnLst>
+                              <p:par>
+                                <p:cTn id="10" presetID="10" presetClass="entr" presetSubtype="0" fill="hold" nodeType="clickEffect">
+                                  <p:stCondLst>
+                                    <p:cond delay="0"/>
+                                  </p:stCondLst>
+                                  <p:childTnLst>
+                                    <p:set>
+                                      <p:cBhvr>
+                                        <p:cTn id="11" dur="1" fill="hold">
+                                          <p:stCondLst>
+                                            <p:cond delay="0"/>
+                                          </p:stCondLst>
+                                        </p:cTn>
+                                        <p:tgtEl>
+                                          <p:spTgt spid="3">
+                                            <p:txEl>
+                                              <p:pRg st="0" end="0"/>
+                                            </p:txEl>
+                                          </p:spTgt>
+                                        </p:tgtEl>
+                                        <p:attrNameLst>
+                                          <p:attrName>style.visibility</p:attrName>
+                                        </p:attrNameLst>
+                                      </p:cBhvr>
+                                      <p:to>
+                                        <p:strVal val="visible"/>
+                                      </p:to>
+                                    </p:set>
+                                    <p:animEffect transition="in" filter="fade">
+                                      <p:cBhvr>
+                                        <p:cTn id="12" dur="500"/>
+                                        <p:tgtEl>
+                                          <p:spTgt spid="3">
+                                            <p:txEl>
+                                              <p:pRg st="0" end="0"/>
+                                            </p:txEl>
+                                          </p:spTgt>
+                                        </p:tgtEl>
+                                      </p:cBhvr>
+                                    </p:animEffect>
+                                  </p:childTnLst>
+                                </p:cTn>
+                              </p:par>
+                            </p:childTnLst>
+                          </p:cTn>
+                        </p:par>
+                      </p:childTnLst>
+                    </p:cTn>
+                  </p:par>
+                  <p:par>
+                    <p:cTn id="13" fill="hold">
+                      <p:stCondLst>
+                        <p:cond delay="indefinite"/>
+                      </p:stCondLst>
+                      <p:childTnLst>
+                        <p:par>
+                          <p:cTn id="14" fill="hold">
+                            <p:stCondLst>
+                              <p:cond delay="0"/>
+                            </p:stCondLst>
+                            <p:childTnLst>
+                              <p:par>
+                                <p:cTn id="15" presetID="10" presetClass="entr" presetSubtype="0" fill="hold" nodeType="clickEffect">
+                                  <p:stCondLst>
+                                    <p:cond delay="0"/>
+                                  </p:stCondLst>
+                                  <p:childTnLst>
+                                    <p:set>
+                                      <p:cBhvr>
+                                        <p:cTn id="16" dur="1" fill="hold">
+                                          <p:stCondLst>
+                                            <p:cond delay="0"/>
+                                          </p:stCondLst>
+                                        </p:cTn>
+                                        <p:tgtEl>
+                                          <p:spTgt spid="6">
+                                            <p:txEl>
+                                              <p:pRg st="0" end="0"/>
+                                            </p:txEl>
+                                          </p:spTgt>
+                                        </p:tgtEl>
+                                        <p:attrNameLst>
+                                          <p:attrName>style.visibility</p:attrName>
+                                        </p:attrNameLst>
+                                      </p:cBhvr>
+                                      <p:to>
+                                        <p:strVal val="visible"/>
+                                      </p:to>
+                                    </p:set>
+                                    <p:animEffect transition="in" filter="fade">
+                                      <p:cBhvr>
+                                        <p:cTn id="17" dur="500"/>
+                                        <p:tgtEl>
+                                          <p:spTgt spid="6">
+                                            <p:txEl>
+                                              <p:pRg st="0" end="0"/>
+                                            </p:txEl>
+                                          </p:spTgt>
+                                        </p:tgtEl>
+                                      </p:cBhvr>
+                                    </p:animEffect>
+                                  </p:childTnLst>
+                                </p:cTn>
+                              </p:par>
+                            </p:childTnLst>
+                          </p:cTn>
+                        </p:par>
+                      </p:childTnLst>
+                    </p:cTn>
+                  </p:par>
+                  <p:par>
+                    <p:cTn id="18" fill="hold">
+                      <p:stCondLst>
+                        <p:cond delay="indefinite"/>
+                      </p:stCondLst>
+                      <p:childTnLst>
+                        <p:par>
+                          <p:cTn id="19" fill="hold">
+                            <p:stCondLst>
+                              <p:cond delay="0"/>
+                            </p:stCondLst>
+                            <p:childTnLst>
+                              <p:par>
+                                <p:cTn id="20" presetID="10" presetClass="entr" presetSubtype="0" fill="hold" nodeType="clickEffect">
+                                  <p:stCondLst>
+                                    <p:cond delay="0"/>
+                                  </p:stCondLst>
+                                  <p:childTnLst>
+                                    <p:set>
+                                      <p:cBhvr>
+                                        <p:cTn id="21" dur="1" fill="hold">
+                                          <p:stCondLst>
+                                            <p:cond delay="0"/>
+                                          </p:stCondLst>
+                                        </p:cTn>
+                                        <p:tgtEl>
+                                          <p:spTgt spid="6">
+                                            <p:txEl>
+                                              <p:pRg st="2" end="2"/>
+                                            </p:txEl>
+                                          </p:spTgt>
+                                        </p:tgtEl>
+                                        <p:attrNameLst>
+                                          <p:attrName>style.visibility</p:attrName>
+                                        </p:attrNameLst>
+                                      </p:cBhvr>
+                                      <p:to>
+                                        <p:strVal val="visible"/>
+                                      </p:to>
+                                    </p:set>
+                                    <p:animEffect transition="in" filter="fade">
+                                      <p:cBhvr>
+                                        <p:cTn id="22" dur="500"/>
+                                        <p:tgtEl>
+                                          <p:spTgt spid="6">
+                                            <p:txEl>
+                                              <p:pRg st="2" end="2"/>
+                                            </p:txEl>
+                                          </p:spTgt>
+                                        </p:tgtEl>
+                                      </p:cBhvr>
+                                    </p:animEffect>
+                                  </p:childTnLst>
+                                </p:cTn>
+                              </p:par>
+                            </p:childTnLst>
+                          </p:cTn>
+                        </p:par>
+                      </p:childTnLst>
+                    </p:cTn>
+                  </p:par>
+                </p:childTnLst>
+              </p:cTn>
+              <p:prevCondLst>
+                <p:cond evt="onPrev" delay="0">
+                  <p:tgtEl>
+                    <p:sldTgt/>
+                  </p:tgtEl>
+                </p:cond>
+              </p:prevCondLst>
+              <p:nextCondLst>
+                <p:cond evt="onNext" delay="0">
+                  <p:tgtEl>
+                    <p:sldTgt/>
+                  </p:tgtEl>
+                </p:cond>
+              </p:nextCondLst>
+            </p:seq>
+          </p:childTnLst>
+        </p:cTn>
+      </p:par>
+    </p:tnLst>
+    <p:bldLst>
+      <p:bldP spid="2" grpId="0"/>
+    </p:bldLst>
+  </p:timing>
+</p:sld>
+</file>
+
+<file path=ppt/slides/slide27.xml><?xml version="1.0" encoding="utf-8"?>
+<p:sld xmlns:a="http://schemas.openxmlformats.org/drawingml/2006/main" xmlns:r="http://schemas.openxmlformats.org/officeDocument/2006/relationships" xmlns:p="http://schemas.openxmlformats.org/presentationml/2006/main">
+  <p:cSld>
+    <p:spTree>
+      <p:nvGrpSpPr>
+        <p:cNvPr id="1" name=""/>
+        <p:cNvGrpSpPr/>
+        <p:nvPr/>
+      </p:nvGrpSpPr>
+      <p:grpSpPr>
+        <a:xfrm>
+          <a:off x="0" y="0"/>
+          <a:ext cx="0" cy="0"/>
+          <a:chOff x="0" y="0"/>
+          <a:chExt cx="0" cy="0"/>
+        </a:xfrm>
+      </p:grpSpPr>
+      <p:sp>
+        <p:nvSpPr>
+          <p:cNvPr id="2" name="标题 1">
+            <a:extLst>
+              <a:ext uri="{FF2B5EF4-FFF2-40B4-BE49-F238E27FC236}">
+                <a16:creationId xmlns:a16="http://schemas.microsoft.com/office/drawing/2014/main" id="{06CA617F-7B10-4BC3-9FED-F7B1D31305C3}"/>
+              </a:ext>
+            </a:extLst>
+          </p:cNvPr>
+          <p:cNvSpPr>
+            <a:spLocks noGrp="1"/>
+          </p:cNvSpPr>
+          <p:nvPr>
+            <p:ph type="title"/>
+          </p:nvPr>
+        </p:nvSpPr>
+        <p:spPr/>
+        <p:txBody>
+          <a:bodyPr/>
+          <a:lstStyle/>
+          <a:p>
+            <a:r>
+              <a:rPr lang="zh-CN" altLang="en-US" dirty="0"/>
+              <a:t>用户级应用：推箱子</a:t>
+            </a:r>
+          </a:p>
+        </p:txBody>
+      </p:sp>
+      <p:sp>
+        <p:nvSpPr>
+          <p:cNvPr id="3" name="文本框 2">
+            <a:extLst>
+              <a:ext uri="{FF2B5EF4-FFF2-40B4-BE49-F238E27FC236}">
+                <a16:creationId xmlns:a16="http://schemas.microsoft.com/office/drawing/2014/main" id="{92952D33-8713-45F9-8F41-9C7D6A6D3AE5}"/>
+              </a:ext>
+            </a:extLst>
+          </p:cNvPr>
+          <p:cNvSpPr txBox="1"/>
+          <p:nvPr/>
+        </p:nvSpPr>
+        <p:spPr>
+          <a:xfrm>
+            <a:off x="6445188" y="923278"/>
+            <a:ext cx="3675356" cy="646331"/>
+          </a:xfrm>
+          <a:prstGeom prst="rect">
+            <a:avLst/>
+          </a:prstGeom>
+          <a:noFill/>
+        </p:spPr>
+        <p:txBody>
+          <a:bodyPr wrap="square" rtlCol="0">
+            <a:spAutoFit/>
+          </a:bodyPr>
+          <a:lstStyle/>
+          <a:p>
+            <a:r>
+              <a:rPr lang="zh-CN" altLang="en-US" dirty="0"/>
+              <a:t>输入指令</a:t>
+            </a:r>
+            <a:r>
+              <a:rPr lang="en-US" altLang="zh-CN" dirty="0"/>
+              <a:t> play -box</a:t>
+            </a:r>
+            <a:r>
+              <a:rPr lang="zh-CN" altLang="en-US" dirty="0"/>
+              <a:t>后，即可初始化游戏</a:t>
+            </a:r>
+          </a:p>
+        </p:txBody>
+      </p:sp>
+      <p:sp>
+        <p:nvSpPr>
+          <p:cNvPr id="6" name="文本框 5">
+            <a:extLst>
+              <a:ext uri="{FF2B5EF4-FFF2-40B4-BE49-F238E27FC236}">
+                <a16:creationId xmlns:a16="http://schemas.microsoft.com/office/drawing/2014/main" id="{CF77AF00-C6D3-4BF0-BDEB-12F9576D0560}"/>
+              </a:ext>
+            </a:extLst>
+          </p:cNvPr>
+          <p:cNvSpPr txBox="1"/>
+          <p:nvPr/>
+        </p:nvSpPr>
+        <p:spPr>
+          <a:xfrm>
+            <a:off x="5992427" y="5663953"/>
+            <a:ext cx="5539666" cy="369332"/>
+          </a:xfrm>
+          <a:prstGeom prst="rect">
+            <a:avLst/>
+          </a:prstGeom>
+          <a:noFill/>
+        </p:spPr>
+        <p:txBody>
+          <a:bodyPr wrap="square" rtlCol="0">
+            <a:spAutoFit/>
+          </a:bodyPr>
+          <a:lstStyle/>
+          <a:p>
+            <a:r>
+              <a:rPr lang="zh-CN" altLang="en-US" dirty="0"/>
+              <a:t>输入</a:t>
+            </a:r>
+            <a:r>
+              <a:rPr lang="en-US" altLang="zh-CN" dirty="0" err="1"/>
+              <a:t>wasd</a:t>
+            </a:r>
+            <a:r>
+              <a:rPr lang="zh-CN" altLang="en-US" dirty="0"/>
+              <a:t>即可控制方向进行移动，按</a:t>
+            </a:r>
+            <a:r>
+              <a:rPr lang="en-US" altLang="zh-CN" dirty="0"/>
+              <a:t>q</a:t>
+            </a:r>
+            <a:r>
+              <a:rPr lang="zh-CN" altLang="en-US" dirty="0"/>
+              <a:t>可以退出</a:t>
+            </a:r>
+          </a:p>
+        </p:txBody>
+      </p:sp>
+      <p:sp>
+        <p:nvSpPr>
+          <p:cNvPr id="7" name="文本框 6">
+            <a:extLst>
+              <a:ext uri="{FF2B5EF4-FFF2-40B4-BE49-F238E27FC236}">
+                <a16:creationId xmlns:a16="http://schemas.microsoft.com/office/drawing/2014/main" id="{50AFC8C2-A5CF-4E2D-8B1C-E520F98FCDE3}"/>
+              </a:ext>
+            </a:extLst>
+          </p:cNvPr>
+          <p:cNvSpPr txBox="1"/>
+          <p:nvPr/>
+        </p:nvSpPr>
+        <p:spPr>
+          <a:xfrm>
+            <a:off x="5619565" y="6105738"/>
+            <a:ext cx="6572435" cy="369332"/>
+          </a:xfrm>
+          <a:prstGeom prst="rect">
+            <a:avLst/>
+          </a:prstGeom>
+          <a:noFill/>
+        </p:spPr>
+        <p:txBody>
+          <a:bodyPr wrap="square" rtlCol="0">
+            <a:spAutoFit/>
+          </a:bodyPr>
+          <a:lstStyle/>
+          <a:p>
+            <a:r>
+              <a:rPr lang="zh-CN" altLang="en-US" dirty="0"/>
+              <a:t>错误处理：输入除</a:t>
+            </a:r>
+            <a:r>
+              <a:rPr lang="en-US" altLang="zh-CN" dirty="0" err="1"/>
+              <a:t>wasdq</a:t>
+            </a:r>
+            <a:r>
+              <a:rPr lang="zh-CN" altLang="en-US" dirty="0"/>
+              <a:t>之外的字符，不会对游戏产生影响</a:t>
+            </a:r>
+          </a:p>
+        </p:txBody>
+      </p:sp>
+      <p:pic>
+        <p:nvPicPr>
+          <p:cNvPr id="8" name="图片 7" descr="文本&#10;&#10;描述已自动生成">
+            <a:extLst>
+              <a:ext uri="{FF2B5EF4-FFF2-40B4-BE49-F238E27FC236}">
+                <a16:creationId xmlns:a16="http://schemas.microsoft.com/office/drawing/2014/main" id="{18E8DDF5-6567-4E95-B7AA-EED489127629}"/>
+              </a:ext>
+            </a:extLst>
+          </p:cNvPr>
+          <p:cNvPicPr>
+            <a:picLocks noChangeAspect="1"/>
+          </p:cNvPicPr>
+          <p:nvPr/>
+        </p:nvPicPr>
+        <p:blipFill>
+          <a:blip r:embed="rId2">
+            <a:extLst>
+              <a:ext uri="{28A0092B-C50C-407E-A947-70E740481C1C}">
+                <a14:useLocalDpi xmlns:a14="http://schemas.microsoft.com/office/drawing/2010/main" val="0"/>
+              </a:ext>
+            </a:extLst>
+          </a:blip>
+          <a:stretch>
+            <a:fillRect/>
+          </a:stretch>
+        </p:blipFill>
+        <p:spPr>
+          <a:xfrm>
+            <a:off x="5017789" y="1642062"/>
+            <a:ext cx="6790019" cy="3786586"/>
+          </a:xfrm>
+          <a:prstGeom prst="rect">
+            <a:avLst/>
+          </a:prstGeom>
+        </p:spPr>
+      </p:pic>
+    </p:spTree>
+    <p:extLst>
+      <p:ext uri="{BB962C8B-B14F-4D97-AF65-F5344CB8AC3E}">
+        <p14:creationId xmlns:p14="http://schemas.microsoft.com/office/powerpoint/2010/main" val="2237560047"/>
+      </p:ext>
+    </p:extLst>
+  </p:cSld>
+  <p:clrMapOvr>
+    <a:masterClrMapping/>
+  </p:clrMapOvr>
+  <p:timing>
+    <p:tnLst>
+      <p:par>
+        <p:cTn id="1" dur="indefinite" restart="never" nodeType="tmRoot">
+          <p:childTnLst>
+            <p:seq concurrent="1" nextAc="seek">
+              <p:cTn id="2" dur="indefinite" nodeType="mainSeq">
+                <p:childTnLst>
+                  <p:par>
+                    <p:cTn id="3" fill="hold">
+                      <p:stCondLst>
+                        <p:cond delay="indefinite"/>
+                      </p:stCondLst>
+                      <p:childTnLst>
+                        <p:par>
+                          <p:cTn id="4" fill="hold">
+                            <p:stCondLst>
+                              <p:cond delay="0"/>
+                            </p:stCondLst>
+                            <p:childTnLst>
+                              <p:par>
+                                <p:cTn id="5" presetID="10" presetClass="entr" presetSubtype="0" fill="hold" grpId="0" nodeType="clickEffect">
+                                  <p:stCondLst>
+                                    <p:cond delay="0"/>
+                                  </p:stCondLst>
+                                  <p:childTnLst>
+                                    <p:set>
+                                      <p:cBhvr>
+                                        <p:cTn id="6" dur="1" fill="hold">
+                                          <p:stCondLst>
+                                            <p:cond delay="0"/>
+                                          </p:stCondLst>
+                                        </p:cTn>
+                                        <p:tgtEl>
+                                          <p:spTgt spid="2"/>
+                                        </p:tgtEl>
+                                        <p:attrNameLst>
+                                          <p:attrName>style.visibility</p:attrName>
+                                        </p:attrNameLst>
+                                      </p:cBhvr>
+                                      <p:to>
+                                        <p:strVal val="visible"/>
+                                      </p:to>
+                                    </p:set>
+                                    <p:animEffect transition="in" filter="fade">
+                                      <p:cBhvr>
+                                        <p:cTn id="7" dur="500"/>
+                                        <p:tgtEl>
+                                          <p:spTgt spid="2"/>
+                                        </p:tgtEl>
+                                      </p:cBhvr>
+                                    </p:animEffect>
+                                  </p:childTnLst>
+                                </p:cTn>
+                              </p:par>
+                            </p:childTnLst>
+                          </p:cTn>
+                        </p:par>
+                      </p:childTnLst>
+                    </p:cTn>
+                  </p:par>
+                  <p:par>
+                    <p:cTn id="8" fill="hold">
+                      <p:stCondLst>
+                        <p:cond delay="indefinite"/>
+                      </p:stCondLst>
+                      <p:childTnLst>
+                        <p:par>
+                          <p:cTn id="9" fill="hold">
+                            <p:stCondLst>
+                              <p:cond delay="0"/>
+                            </p:stCondLst>
+                            <p:childTnLst>
+                              <p:par>
+                                <p:cTn id="10" presetID="10" presetClass="entr" presetSubtype="0" fill="hold" nodeType="clickEffect">
+                                  <p:stCondLst>
+                                    <p:cond delay="0"/>
+                                  </p:stCondLst>
+                                  <p:childTnLst>
+                                    <p:set>
+                                      <p:cBhvr>
+                                        <p:cTn id="11" dur="1" fill="hold">
+                                          <p:stCondLst>
+                                            <p:cond delay="0"/>
+                                          </p:stCondLst>
+                                        </p:cTn>
+                                        <p:tgtEl>
+                                          <p:spTgt spid="3">
+                                            <p:txEl>
+                                              <p:pRg st="0" end="0"/>
+                                            </p:txEl>
+                                          </p:spTgt>
+                                        </p:tgtEl>
+                                        <p:attrNameLst>
+                                          <p:attrName>style.visibility</p:attrName>
+                                        </p:attrNameLst>
+                                      </p:cBhvr>
+                                      <p:to>
+                                        <p:strVal val="visible"/>
+                                      </p:to>
+                                    </p:set>
+                                    <p:animEffect transition="in" filter="fade">
+                                      <p:cBhvr>
+                                        <p:cTn id="12" dur="500"/>
+                                        <p:tgtEl>
+                                          <p:spTgt spid="3">
+                                            <p:txEl>
+                                              <p:pRg st="0" end="0"/>
+                                            </p:txEl>
+                                          </p:spTgt>
+                                        </p:tgtEl>
+                                      </p:cBhvr>
+                                    </p:animEffect>
+                                  </p:childTnLst>
+                                </p:cTn>
+                              </p:par>
+                            </p:childTnLst>
+                          </p:cTn>
+                        </p:par>
+                      </p:childTnLst>
+                    </p:cTn>
+                  </p:par>
+                  <p:par>
+                    <p:cTn id="13" fill="hold">
+                      <p:stCondLst>
+                        <p:cond delay="indefinite"/>
+                      </p:stCondLst>
+                      <p:childTnLst>
+                        <p:par>
+                          <p:cTn id="14" fill="hold">
+                            <p:stCondLst>
+                              <p:cond delay="0"/>
+                            </p:stCondLst>
+                            <p:childTnLst>
+                              <p:par>
+                                <p:cTn id="15" presetID="10" presetClass="entr" presetSubtype="0" fill="hold" nodeType="clickEffect">
+                                  <p:stCondLst>
+                                    <p:cond delay="0"/>
+                                  </p:stCondLst>
+                                  <p:childTnLst>
+                                    <p:set>
+                                      <p:cBhvr>
+                                        <p:cTn id="16" dur="1" fill="hold">
+                                          <p:stCondLst>
+                                            <p:cond delay="0"/>
+                                          </p:stCondLst>
+                                        </p:cTn>
+                                        <p:tgtEl>
+                                          <p:spTgt spid="6">
+                                            <p:txEl>
+                                              <p:pRg st="0" end="0"/>
+                                            </p:txEl>
+                                          </p:spTgt>
+                                        </p:tgtEl>
+                                        <p:attrNameLst>
+                                          <p:attrName>style.visibility</p:attrName>
+                                        </p:attrNameLst>
+                                      </p:cBhvr>
+                                      <p:to>
+                                        <p:strVal val="visible"/>
+                                      </p:to>
+                                    </p:set>
+                                    <p:animEffect transition="in" filter="fade">
+                                      <p:cBhvr>
+                                        <p:cTn id="17" dur="500"/>
+                                        <p:tgtEl>
+                                          <p:spTgt spid="6">
+                                            <p:txEl>
+                                              <p:pRg st="0" end="0"/>
+                                            </p:txEl>
+                                          </p:spTgt>
+                                        </p:tgtEl>
+                                      </p:cBhvr>
+                                    </p:animEffect>
+                                  </p:childTnLst>
+                                </p:cTn>
+                              </p:par>
+                            </p:childTnLst>
+                          </p:cTn>
+                        </p:par>
+                      </p:childTnLst>
+                    </p:cTn>
+                  </p:par>
+                  <p:par>
+                    <p:cTn id="18" fill="hold">
+                      <p:stCondLst>
+                        <p:cond delay="indefinite"/>
+                      </p:stCondLst>
+                      <p:childTnLst>
+                        <p:par>
+                          <p:cTn id="19" fill="hold">
+                            <p:stCondLst>
+                              <p:cond delay="0"/>
+                            </p:stCondLst>
+                            <p:childTnLst>
+                              <p:par>
+                                <p:cTn id="20" presetID="10" presetClass="entr" presetSubtype="0" fill="hold" grpId="0" nodeType="clickEffect">
+                                  <p:stCondLst>
+                                    <p:cond delay="0"/>
+                                  </p:stCondLst>
+                                  <p:childTnLst>
+                                    <p:set>
+                                      <p:cBhvr>
+                                        <p:cTn id="21" dur="1" fill="hold">
+                                          <p:stCondLst>
+                                            <p:cond delay="0"/>
+                                          </p:stCondLst>
+                                        </p:cTn>
+                                        <p:tgtEl>
+                                          <p:spTgt spid="7"/>
+                                        </p:tgtEl>
+                                        <p:attrNameLst>
+                                          <p:attrName>style.visibility</p:attrName>
+                                        </p:attrNameLst>
+                                      </p:cBhvr>
+                                      <p:to>
+                                        <p:strVal val="visible"/>
+                                      </p:to>
+                                    </p:set>
+                                    <p:animEffect transition="in" filter="fade">
+                                      <p:cBhvr>
+                                        <p:cTn id="22" dur="500"/>
+                                        <p:tgtEl>
+                                          <p:spTgt spid="7"/>
+                                        </p:tgtEl>
+                                      </p:cBhvr>
+                                    </p:animEffect>
+                                  </p:childTnLst>
+                                </p:cTn>
+                              </p:par>
+                            </p:childTnLst>
+                          </p:cTn>
+                        </p:par>
+                      </p:childTnLst>
+                    </p:cTn>
+                  </p:par>
+                </p:childTnLst>
+              </p:cTn>
+              <p:prevCondLst>
+                <p:cond evt="onPrev" delay="0">
+                  <p:tgtEl>
+                    <p:sldTgt/>
+                  </p:tgtEl>
+                </p:cond>
+              </p:prevCondLst>
+              <p:nextCondLst>
+                <p:cond evt="onNext" delay="0">
+                  <p:tgtEl>
+                    <p:sldTgt/>
+                  </p:tgtEl>
+                </p:cond>
+              </p:nextCondLst>
+            </p:seq>
+          </p:childTnLst>
+        </p:cTn>
+      </p:par>
+    </p:tnLst>
+    <p:bldLst>
+      <p:bldP spid="2" grpId="0"/>
+      <p:bldP spid="7" grpId="0"/>
+    </p:bldLst>
+  </p:timing>
+</p:sld>
+</file>
+
 <file path=ppt/slides/slide3.xml><?xml version="1.0" encoding="utf-8"?>
 <p:sld xmlns:a="http://schemas.openxmlformats.org/drawingml/2006/main" xmlns:r="http://schemas.openxmlformats.org/officeDocument/2006/relationships" xmlns:p="http://schemas.openxmlformats.org/presentationml/2006/main">
   <p:cSld>

</xml_diff>